<commit_message>
Fix typos in presentation
Signed-off-by: Kyrylo Vasylenko <vasilenkowm@gmail.com>
</commit_message>
<xml_diff>
--- a/Presentations/Singleton.pptx
+++ b/Presentations/Singleton.pptx
@@ -239,7 +239,7 @@
           <a:p>
             <a:fld id="{7DA61AE2-9EF6-415B-9BBA-5F4A98ACC92C}" type="datetimeFigureOut">
               <a:rPr lang="ru-RU" smtClean="0"/>
-              <a:t>23.02.2019</a:t>
+              <a:t>24.02.2019</a:t>
             </a:fld>
             <a:endParaRPr lang="ru-RU"/>
           </a:p>
@@ -405,7 +405,7 @@
           <a:p>
             <a:fld id="{764A51CA-9947-44BA-9AA7-66724FE8E627}" type="datetimeFigureOut">
               <a:rPr lang="ru-RU" smtClean="0"/>
-              <a:t>23.02.2019</a:t>
+              <a:t>24.02.2019</a:t>
             </a:fld>
             <a:endParaRPr lang="ru-RU"/>
           </a:p>
@@ -979,7 +979,23 @@
           <a:p>
             <a:r>
               <a:rPr lang="en-US" dirty="0" smtClean="0"/>
-              <a:t>But in most of the scenarios, Singleton classes are created for resources such as File System, Database connections etc. </a:t>
+              <a:t>But in </a:t>
+            </a:r>
+            <a:r>
+              <a:rPr lang="en-US" dirty="0" smtClean="0"/>
+              <a:t>most</a:t>
+            </a:r>
+            <a:r>
+              <a:rPr lang="en-US" baseline="0" dirty="0" smtClean="0"/>
+              <a:t> </a:t>
+            </a:r>
+            <a:r>
+              <a:rPr lang="en-US" dirty="0" smtClean="0"/>
+              <a:t>scenarios</a:t>
+            </a:r>
+            <a:r>
+              <a:rPr lang="en-US" dirty="0" smtClean="0"/>
+              <a:t>, Singleton classes are created for resources such as File System, Database connections etc. </a:t>
             </a:r>
           </a:p>
           <a:p>
@@ -1570,7 +1586,7 @@
           <a:p>
             <a:fld id="{7B55B851-DE93-4D4A-A8CA-11031B51EA79}" type="datetime3">
               <a:rPr lang="en-US" smtClean="0"/>
-              <a:t>23 February 2019</a:t>
+              <a:t>24 February 2019</a:t>
             </a:fld>
             <a:endParaRPr lang="ru-RU"/>
           </a:p>
@@ -1759,7 +1775,7 @@
           <a:p>
             <a:fld id="{E86EBA65-FBEF-4E78-B3EC-E0E9A1688544}" type="datetime3">
               <a:rPr lang="en-US" smtClean="0"/>
-              <a:t>23 February 2019</a:t>
+              <a:t>24 February 2019</a:t>
             </a:fld>
             <a:endParaRPr lang="ru-RU"/>
           </a:p>
@@ -1951,7 +1967,7 @@
           <a:p>
             <a:fld id="{B7F9F018-6DB4-4741-B32F-EC558344D423}" type="datetime3">
               <a:rPr lang="en-US" smtClean="0"/>
-              <a:t>23 February 2019</a:t>
+              <a:t>24 February 2019</a:t>
             </a:fld>
             <a:endParaRPr lang="ru-RU"/>
           </a:p>
@@ -2133,7 +2149,7 @@
           <a:p>
             <a:fld id="{F3E29414-314B-4BBC-90EC-F581425B44D3}" type="datetime3">
               <a:rPr lang="en-US" smtClean="0"/>
-              <a:t>23 February 2019</a:t>
+              <a:t>24 February 2019</a:t>
             </a:fld>
             <a:endParaRPr lang="ru-RU"/>
           </a:p>
@@ -2398,7 +2414,7 @@
           <a:p>
             <a:fld id="{C197B7D8-4027-4BC0-B809-A55EFBE429E1}" type="datetime3">
               <a:rPr lang="en-US" smtClean="0"/>
-              <a:t>23 February 2019</a:t>
+              <a:t>24 February 2019</a:t>
             </a:fld>
             <a:endParaRPr lang="ru-RU"/>
           </a:p>
@@ -2642,7 +2658,7 @@
           <a:p>
             <a:fld id="{B7C170E9-6698-4598-956D-28CDE8856D34}" type="datetime3">
               <a:rPr lang="en-US" smtClean="0"/>
-              <a:t>23 February 2019</a:t>
+              <a:t>24 February 2019</a:t>
             </a:fld>
             <a:endParaRPr lang="ru-RU"/>
           </a:p>
@@ -3028,7 +3044,7 @@
           <a:p>
             <a:fld id="{D06DAEBC-00FB-43E2-9A62-728BCC36BCDE}" type="datetime3">
               <a:rPr lang="en-US" smtClean="0"/>
-              <a:t>23 February 2019</a:t>
+              <a:t>24 February 2019</a:t>
             </a:fld>
             <a:endParaRPr lang="ru-RU"/>
           </a:p>
@@ -3165,7 +3181,7 @@
           <a:p>
             <a:fld id="{AB18DE3F-9B93-4889-A323-6EC312FABF66}" type="datetime3">
               <a:rPr lang="en-US" smtClean="0"/>
-              <a:t>23 February 2019</a:t>
+              <a:t>24 February 2019</a:t>
             </a:fld>
             <a:endParaRPr lang="ru-RU"/>
           </a:p>
@@ -3279,7 +3295,7 @@
           <a:p>
             <a:fld id="{E8316F82-631A-4238-BABA-C9B8B6C4F978}" type="datetime3">
               <a:rPr lang="en-US" smtClean="0"/>
-              <a:t>23 February 2019</a:t>
+              <a:t>24 February 2019</a:t>
             </a:fld>
             <a:endParaRPr lang="ru-RU"/>
           </a:p>
@@ -3575,7 +3591,7 @@
           <a:p>
             <a:fld id="{ABB24B70-A4CD-4445-BB16-669A3264FA19}" type="datetime3">
               <a:rPr lang="en-US" smtClean="0"/>
-              <a:t>23 February 2019</a:t>
+              <a:t>24 February 2019</a:t>
             </a:fld>
             <a:endParaRPr lang="ru-RU"/>
           </a:p>
@@ -3840,7 +3856,7 @@
           <a:p>
             <a:fld id="{CF014D9A-44C2-4A81-AA5B-B49ED5839460}" type="datetime3">
               <a:rPr lang="en-US" smtClean="0"/>
-              <a:t>23 February 2019</a:t>
+              <a:t>24 February 2019</a:t>
             </a:fld>
             <a:endParaRPr lang="ru-RU"/>
           </a:p>
@@ -4065,7 +4081,7 @@
           <a:p>
             <a:fld id="{9B43955C-E4C2-41B5-8098-ADB300087B42}" type="datetime3">
               <a:rPr lang="en-US" smtClean="0"/>
-              <a:t>23 February 2019</a:t>
+              <a:t>24 February 2019</a:t>
             </a:fld>
             <a:endParaRPr lang="ru-RU"/>
           </a:p>
@@ -6515,7 +6531,7 @@
                   <a:schemeClr val="tx1"/>
                 </a:solidFill>
               </a:rPr>
-              <a:t>23 February 2019</a:t>
+              <a:t>24 February 2019</a:t>
             </a:fld>
             <a:endParaRPr lang="ru-RU">
               <a:solidFill>
@@ -7327,7 +7343,7 @@
                   <a:schemeClr val="tx1"/>
                 </a:solidFill>
               </a:rPr>
-              <a:t>23 February 2019</a:t>
+              <a:t>24 February 2019</a:t>
             </a:fld>
             <a:endParaRPr lang="ru-RU">
               <a:solidFill>
@@ -7576,11 +7592,11 @@
             </a:pPr>
             <a:r>
               <a:rPr lang="en-US" sz="3200" dirty="0"/>
-              <a:t>How about creating non-thread </a:t>
+              <a:t>How about creating </a:t>
             </a:r>
             <a:r>
               <a:rPr lang="en-US" sz="3200" dirty="0" smtClean="0"/>
-              <a:t>safe implementation?</a:t>
+              <a:t>a friend class?</a:t>
             </a:r>
             <a:endParaRPr lang="ru-RU" sz="3200" dirty="0"/>
           </a:p>
@@ -8072,7 +8088,7 @@
                   <a:schemeClr val="tx1"/>
                 </a:solidFill>
               </a:rPr>
-              <a:t>23 February 2019</a:t>
+              <a:t>24 February 2019</a:t>
             </a:fld>
             <a:endParaRPr lang="ru-RU">
               <a:solidFill>
@@ -8711,7 +8727,7 @@
                   <a:schemeClr val="tx1"/>
                 </a:solidFill>
               </a:rPr>
-              <a:t>23 February 2019</a:t>
+              <a:t>24 February 2019</a:t>
             </a:fld>
             <a:endParaRPr lang="ru-RU">
               <a:solidFill>
@@ -8789,7 +8805,7 @@
         <p:spPr>
           <a:xfrm>
             <a:off x="0" y="1494896"/>
-            <a:ext cx="11524343" cy="646331"/>
+            <a:ext cx="11930743" cy="646331"/>
           </a:xfrm>
           <a:prstGeom prst="rect">
             <a:avLst/>
@@ -8812,7 +8828,11 @@
             </a:r>
             <a:r>
               <a:rPr lang="en-US" sz="3600" b="1" dirty="0" smtClean="0"/>
-              <a:t>resource contention</a:t>
+              <a:t>resource </a:t>
+            </a:r>
+            <a:r>
+              <a:rPr lang="en-US" sz="3600" b="1" dirty="0" smtClean="0"/>
+              <a:t>management</a:t>
             </a:r>
             <a:endParaRPr lang="ru-RU" sz="3600" b="1" dirty="0"/>
           </a:p>
@@ -9755,7 +9775,7 @@
                   <a:schemeClr val="tx1"/>
                 </a:solidFill>
               </a:rPr>
-              <a:t>23 February 2019</a:t>
+              <a:t>24 February 2019</a:t>
             </a:fld>
             <a:endParaRPr lang="ru-RU">
               <a:solidFill>
@@ -10580,7 +10600,7 @@
                   <a:schemeClr val="tx1"/>
                 </a:solidFill>
               </a:rPr>
-              <a:t>23 February 2019</a:t>
+              <a:t>24 February 2019</a:t>
             </a:fld>
             <a:endParaRPr lang="ru-RU">
               <a:solidFill>
@@ -11644,7 +11664,7 @@
                   <a:schemeClr val="tx1"/>
                 </a:solidFill>
               </a:rPr>
-              <a:t>23 February 2019</a:t>
+              <a:t>24 February 2019</a:t>
             </a:fld>
             <a:endParaRPr lang="ru-RU">
               <a:solidFill>
@@ -12132,7 +12152,7 @@
                   <a:schemeClr val="tx1"/>
                 </a:solidFill>
               </a:rPr>
-              <a:t>23 February 2019</a:t>
+              <a:t>24 February 2019</a:t>
             </a:fld>
             <a:endParaRPr lang="ru-RU">
               <a:solidFill>
@@ -12631,7 +12651,7 @@
                   <a:schemeClr val="tx1"/>
                 </a:solidFill>
               </a:rPr>
-              <a:t>23 February 2019</a:t>
+              <a:t>24 February 2019</a:t>
             </a:fld>
             <a:endParaRPr lang="ru-RU">
               <a:solidFill>

</xml_diff>